<commit_message>
added misc notes to presentation
</commit_message>
<xml_diff>
--- a/Presentation/Presentation.pptx
+++ b/Presentation/Presentation.pptx
@@ -4612,11 +4612,59 @@
             </a:r>
             <a:r>
               <a:rPr lang="en-US" dirty="0" smtClean="0"/>
-              <a:t>/cucumber/bin/</a:t>
-            </a:r>
-            <a:r>
-              <a:rPr lang="en-US" smtClean="0"/>
+              <a:t>/.bin/</a:t>
+            </a:r>
+            <a:r>
+              <a:rPr lang="en-US" dirty="0" err="1" smtClean="0"/>
               <a:t>cucumber.js</a:t>
+            </a:r>
+            <a:endParaRPr lang="en-US" dirty="0" smtClean="0"/>
+          </a:p>
+          <a:p>
+            <a:pPr marL="342900" indent="-342900">
+              <a:buFont typeface="Arial"/>
+              <a:buChar char="•"/>
+            </a:pPr>
+            <a:r>
+              <a:rPr lang="en-US" dirty="0" smtClean="0"/>
+              <a:t>URL for tests in browser </a:t>
+            </a:r>
+            <a:r>
+              <a:rPr lang="en-US" dirty="0"/>
+              <a:t>– </a:t>
+            </a:r>
+            <a:r>
+              <a:rPr lang="en-US" dirty="0">
+                <a:hlinkClick r:id="rId2"/>
+              </a:rPr>
+              <a:t>http://localhost:8080/tests/</a:t>
+            </a:r>
+            <a:r>
+              <a:rPr lang="en-US" dirty="0" smtClean="0">
+                <a:hlinkClick r:id="rId2"/>
+              </a:rPr>
+              <a:t>testExerciseService.html</a:t>
+            </a:r>
+            <a:endParaRPr lang="en-US" dirty="0" smtClean="0"/>
+          </a:p>
+          <a:p>
+            <a:pPr marL="342900" indent="-342900">
+              <a:buFont typeface="Arial"/>
+              <a:buChar char="•"/>
+            </a:pPr>
+            <a:r>
+              <a:rPr lang="en-US" dirty="0" smtClean="0"/>
+              <a:t>URL for </a:t>
+            </a:r>
+            <a:r>
+              <a:rPr lang="en-US" smtClean="0"/>
+              <a:t>app - </a:t>
+            </a:r>
+            <a:r>
+              <a:rPr lang="en-US">
+                <a:hlinkClick r:id="rId2"/>
+              </a:rPr>
+              <a:t>http://localhost:8080</a:t>
             </a:r>
             <a:endParaRPr lang="en-US" dirty="0" smtClean="0"/>
           </a:p>

</xml_diff>